<commit_message>
small formatting changes to presentation
</commit_message>
<xml_diff>
--- a/DS_210/final/DS 210.pptx
+++ b/DS_210/final/DS 210.pptx
@@ -9,8 +9,8 @@
     <p:sldId id="257" r:id="rId3"/>
     <p:sldId id="258" r:id="rId4"/>
     <p:sldId id="259" r:id="rId5"/>
-    <p:sldId id="260" r:id="rId6"/>
-    <p:sldId id="263" r:id="rId7"/>
+    <p:sldId id="263" r:id="rId6"/>
+    <p:sldId id="260" r:id="rId7"/>
     <p:sldId id="261" r:id="rId8"/>
     <p:sldId id="262" r:id="rId9"/>
     <p:sldId id="264" r:id="rId10"/>
@@ -121,6 +121,11 @@
       </a:defRPr>
     </a:lvl9pPr>
   </p:defaultTextStyle>
+  <p:extLst>
+    <p:ext uri="{EFAFB233-063F-42B5-8137-9DF3F51BA10A}">
+      <p15:sldGuideLst xmlns:p15="http://schemas.microsoft.com/office/powerpoint/2012/main"/>
+    </p:ext>
+  </p:extLst>
 </p:presentation>
 </file>
 
@@ -5471,7 +5476,7 @@
         <a:p>
           <a:r>
             <a:rPr lang="en-US" dirty="0"/>
-            <a:t>Can we estimate outside temperature based on chirp frequency</a:t>
+            <a:t>Can we estimate outside temperature based on chirp frequency?</a:t>
           </a:r>
         </a:p>
       </dgm:t>
@@ -5543,7 +5548,7 @@
         <a:p>
           <a:r>
             <a:rPr lang="en-US" dirty="0"/>
-            <a:t>Scrubbed our product for processed</a:t>
+            <a:t>Scrubbed our product for processing</a:t>
           </a:r>
         </a:p>
       </dgm:t>
@@ -5706,6 +5711,13 @@
     <dgm:pt modelId="{41DEDD8E-C989-48ED-BB23-3176F9EADCA9}" type="sibTrans" cxnId="{02262E6A-7305-4EE5-8100-CF8B2D1E13B5}">
       <dgm:prSet/>
       <dgm:spPr/>
+      <dgm:t>
+        <a:bodyPr/>
+        <a:lstStyle/>
+        <a:p>
+          <a:endParaRPr lang="en-US"/>
+        </a:p>
+      </dgm:t>
     </dgm:pt>
     <dgm:pt modelId="{52196BBC-FDDD-4561-8F43-79CD039561DC}">
       <dgm:prSet/>
@@ -5735,6 +5747,13 @@
     <dgm:pt modelId="{245E8D63-09CF-485E-A0EA-EA55512F7E71}" type="sibTrans" cxnId="{86AE8DA6-2739-4438-8065-0953A5C4089C}">
       <dgm:prSet/>
       <dgm:spPr/>
+      <dgm:t>
+        <a:bodyPr/>
+        <a:lstStyle/>
+        <a:p>
+          <a:endParaRPr lang="en-US"/>
+        </a:p>
+      </dgm:t>
     </dgm:pt>
     <dgm:pt modelId="{602D02A1-38D9-430D-8FC4-E5976289C4C1}">
       <dgm:prSet/>
@@ -5764,6 +5783,13 @@
     <dgm:pt modelId="{24354829-96DB-49DB-A8E7-433AF1F082C6}" type="sibTrans" cxnId="{0757E29A-16FF-4C7E-AFC5-9979F7B57438}">
       <dgm:prSet/>
       <dgm:spPr/>
+      <dgm:t>
+        <a:bodyPr/>
+        <a:lstStyle/>
+        <a:p>
+          <a:endParaRPr lang="en-US"/>
+        </a:p>
+      </dgm:t>
     </dgm:pt>
     <dgm:pt modelId="{8CCAE849-B563-4CF5-9552-0DE4194A6DD0}">
       <dgm:prSet/>
@@ -5793,6 +5819,13 @@
     <dgm:pt modelId="{BE588C1E-A9BB-40C8-A8D5-03C462BEAEC3}" type="sibTrans" cxnId="{F802C964-5240-42D2-B833-A3A438C82C94}">
       <dgm:prSet/>
       <dgm:spPr/>
+      <dgm:t>
+        <a:bodyPr/>
+        <a:lstStyle/>
+        <a:p>
+          <a:endParaRPr lang="en-US"/>
+        </a:p>
+      </dgm:t>
     </dgm:pt>
     <dgm:pt modelId="{28660098-959B-426C-969E-0727AD369027}">
       <dgm:prSet/>
@@ -5822,6 +5855,13 @@
     <dgm:pt modelId="{42B59699-95E7-4E47-85C8-4FDE622C2148}" type="sibTrans" cxnId="{80225552-9AE9-4964-9BE7-BAA1D5911658}">
       <dgm:prSet/>
       <dgm:spPr/>
+      <dgm:t>
+        <a:bodyPr/>
+        <a:lstStyle/>
+        <a:p>
+          <a:endParaRPr lang="en-US"/>
+        </a:p>
+      </dgm:t>
     </dgm:pt>
     <dgm:pt modelId="{3DDAA059-28FF-4338-AD8B-04FDDD01A1EA}">
       <dgm:prSet/>
@@ -5851,6 +5891,13 @@
     <dgm:pt modelId="{7E17586F-E4CC-4C7F-B2FB-7B06FF39F41F}" type="sibTrans" cxnId="{40B09F13-191C-4FA0-96F3-219F20641FDD}">
       <dgm:prSet/>
       <dgm:spPr/>
+      <dgm:t>
+        <a:bodyPr/>
+        <a:lstStyle/>
+        <a:p>
+          <a:endParaRPr lang="en-US"/>
+        </a:p>
+      </dgm:t>
     </dgm:pt>
     <dgm:pt modelId="{4F4EEC9D-D219-4E01-88A7-FDBD429356F5}" type="pres">
       <dgm:prSet presAssocID="{0EA9049D-00B7-4678-BA9A-1F2F6E0AE135}" presName="linear" presStyleCnt="0">
@@ -7962,7 +8009,7 @@
           </a:pPr>
           <a:r>
             <a:rPr lang="en-US" sz="1300" kern="1200" dirty="0"/>
-            <a:t>Can we estimate outside temperature based on chirp frequency</a:t>
+            <a:t>Can we estimate outside temperature based on chirp frequency?</a:t>
           </a:r>
         </a:p>
       </dsp:txBody>
@@ -8386,7 +8433,7 @@
           </a:pPr>
           <a:r>
             <a:rPr lang="en-US" sz="1300" kern="1200" dirty="0"/>
-            <a:t>Scrubbed our product for processed</a:t>
+            <a:t>Scrubbed our product for processing</a:t>
           </a:r>
         </a:p>
       </dsp:txBody>
@@ -22983,7 +23030,7 @@
             <p:ph idx="1"/>
             <p:extLst>
               <p:ext uri="{D42A27DB-BD31-4B8C-83A1-F6EECF244321}">
-                <p14:modId xmlns:p14="http://schemas.microsoft.com/office/powerpoint/2010/main" val="3732596289"/>
+                <p14:modId xmlns:p14="http://schemas.microsoft.com/office/powerpoint/2010/main" val="1296916387"/>
               </p:ext>
             </p:extLst>
           </p:nvPr>
@@ -25097,469 +25144,6 @@
           <a:chExt cx="0" cy="0"/>
         </a:xfrm>
       </p:grpSpPr>
-      <p:sp>
-        <p:nvSpPr>
-          <p:cNvPr id="12" name="Freeform: Shape 11">
-            <a:extLst>
-              <a:ext uri="{FF2B5EF4-FFF2-40B4-BE49-F238E27FC236}">
-                <a16:creationId xmlns:a16="http://schemas.microsoft.com/office/drawing/2014/main" id="{AE192E3E-68A9-4F36-936C-1C8D0B9EF132}"/>
-              </a:ext>
-              <a:ext uri="{C183D7F6-B498-43B3-948B-1728B52AA6E4}">
-                <adec:decorative xmlns:adec="http://schemas.microsoft.com/office/drawing/2017/decorative" val="1"/>
-              </a:ext>
-            </a:extLst>
-          </p:cNvPr>
-          <p:cNvSpPr>
-            <a:spLocks noGrp="1" noRot="1" noChangeAspect="1" noMove="1" noResize="1" noEditPoints="1" noAdjustHandles="1" noChangeArrowheads="1" noChangeShapeType="1" noTextEdit="1"/>
-          </p:cNvSpPr>
-          <p:nvPr>
-            <p:extLst>
-              <p:ext uri="{386F3935-93C4-4BCD-93E2-E3B085C9AB24}">
-                <p16:designElem xmlns:p16="http://schemas.microsoft.com/office/powerpoint/2015/main" val="1"/>
-              </p:ext>
-            </p:extLst>
-          </p:nvPr>
-        </p:nvSpPr>
-        <p:spPr>
-          <a:xfrm>
-            <a:off x="8803792" y="3455896"/>
-            <a:ext cx="3388208" cy="3406341"/>
-          </a:xfrm>
-          <a:custGeom>
-            <a:avLst/>
-            <a:gdLst>
-              <a:gd name="connsiteX0" fmla="*/ 3388058 w 3388208"/>
-              <a:gd name="connsiteY0" fmla="*/ 0 h 3406341"/>
-              <a:gd name="connsiteX1" fmla="*/ 3388208 w 3388208"/>
-              <a:gd name="connsiteY1" fmla="*/ 0 h 3406341"/>
-              <a:gd name="connsiteX2" fmla="*/ 3388208 w 3388208"/>
-              <a:gd name="connsiteY2" fmla="*/ 3406341 h 3406341"/>
-              <a:gd name="connsiteX3" fmla="*/ 0 w 3388208"/>
-              <a:gd name="connsiteY3" fmla="*/ 3406341 h 3406341"/>
-              <a:gd name="connsiteX4" fmla="*/ 79006 w 3388208"/>
-              <a:gd name="connsiteY4" fmla="*/ 3404386 h 3406341"/>
-              <a:gd name="connsiteX5" fmla="*/ 3383947 w 3388208"/>
-              <a:gd name="connsiteY5" fmla="*/ 164274 h 3406341"/>
-            </a:gdLst>
-            <a:ahLst/>
-            <a:cxnLst>
-              <a:cxn ang="0">
-                <a:pos x="connsiteX0" y="connsiteY0"/>
-              </a:cxn>
-              <a:cxn ang="0">
-                <a:pos x="connsiteX1" y="connsiteY1"/>
-              </a:cxn>
-              <a:cxn ang="0">
-                <a:pos x="connsiteX2" y="connsiteY2"/>
-              </a:cxn>
-              <a:cxn ang="0">
-                <a:pos x="connsiteX3" y="connsiteY3"/>
-              </a:cxn>
-              <a:cxn ang="0">
-                <a:pos x="connsiteX4" y="connsiteY4"/>
-              </a:cxn>
-              <a:cxn ang="0">
-                <a:pos x="connsiteX5" y="connsiteY5"/>
-              </a:cxn>
-            </a:cxnLst>
-            <a:rect l="l" t="t" r="r" b="b"/>
-            <a:pathLst>
-              <a:path w="3388208" h="3406341">
-                <a:moveTo>
-                  <a:pt x="3388058" y="0"/>
-                </a:moveTo>
-                <a:lnTo>
-                  <a:pt x="3388208" y="0"/>
-                </a:lnTo>
-                <a:lnTo>
-                  <a:pt x="3388208" y="3406341"/>
-                </a:lnTo>
-                <a:lnTo>
-                  <a:pt x="0" y="3406341"/>
-                </a:lnTo>
-                <a:lnTo>
-                  <a:pt x="79006" y="3404386"/>
-                </a:lnTo>
-                <a:cubicBezTo>
-                  <a:pt x="1864742" y="3315784"/>
-                  <a:pt x="3296223" y="1912901"/>
-                  <a:pt x="3383947" y="164274"/>
-                </a:cubicBezTo>
-                <a:close/>
-              </a:path>
-            </a:pathLst>
-          </a:custGeom>
-          <a:solidFill>
-            <a:schemeClr val="accent5"/>
-          </a:solidFill>
-          <a:ln>
-            <a:noFill/>
-          </a:ln>
-        </p:spPr>
-        <p:style>
-          <a:lnRef idx="2">
-            <a:schemeClr val="accent1">
-              <a:shade val="50000"/>
-            </a:schemeClr>
-          </a:lnRef>
-          <a:fillRef idx="1">
-            <a:schemeClr val="accent1"/>
-          </a:fillRef>
-          <a:effectRef idx="0">
-            <a:schemeClr val="accent1"/>
-          </a:effectRef>
-          <a:fontRef idx="minor">
-            <a:schemeClr val="lt1"/>
-          </a:fontRef>
-        </p:style>
-        <p:txBody>
-          <a:bodyPr wrap="square" rtlCol="0" anchor="ctr">
-            <a:noAutofit/>
-          </a:bodyPr>
-          <a:lstStyle/>
-          <a:p>
-            <a:pPr algn="ctr"/>
-            <a:endParaRPr lang="en-US"/>
-          </a:p>
-        </p:txBody>
-      </p:sp>
-      <p:sp useBgFill="1">
-        <p:nvSpPr>
-          <p:cNvPr id="14" name="Rectangle 13">
-            <a:extLst>
-              <a:ext uri="{FF2B5EF4-FFF2-40B4-BE49-F238E27FC236}">
-                <a16:creationId xmlns:a16="http://schemas.microsoft.com/office/drawing/2014/main" id="{8FB1897B-3F14-4996-810D-54D93A629F41}"/>
-              </a:ext>
-              <a:ext uri="{C183D7F6-B498-43B3-948B-1728B52AA6E4}">
-                <adec:decorative xmlns:adec="http://schemas.microsoft.com/office/drawing/2017/decorative" val="1"/>
-              </a:ext>
-            </a:extLst>
-          </p:cNvPr>
-          <p:cNvSpPr>
-            <a:spLocks noGrp="1" noRot="1" noChangeAspect="1" noMove="1" noResize="1" noEditPoints="1" noAdjustHandles="1" noChangeArrowheads="1" noChangeShapeType="1" noTextEdit="1"/>
-          </p:cNvSpPr>
-          <p:nvPr>
-            <p:extLst>
-              <p:ext uri="{386F3935-93C4-4BCD-93E2-E3B085C9AB24}">
-                <p16:designElem xmlns:p16="http://schemas.microsoft.com/office/powerpoint/2015/main" val="1"/>
-              </p:ext>
-            </p:extLst>
-          </p:nvPr>
-        </p:nvSpPr>
-        <p:spPr>
-          <a:xfrm>
-            <a:off x="0" y="0"/>
-            <a:ext cx="12192000" cy="6858000"/>
-          </a:xfrm>
-          <a:prstGeom prst="rect">
-            <a:avLst/>
-          </a:prstGeom>
-          <a:ln w="12700" cap="flat" cmpd="sng" algn="ctr">
-            <a:noFill/>
-            <a:prstDash val="solid"/>
-            <a:miter lim="800000"/>
-          </a:ln>
-          <a:effectLst/>
-          <a:extLst>
-            <a:ext uri="{91240B29-F687-4F45-9708-019B960494DF}">
-              <a14:hiddenLine xmlns:a14="http://schemas.microsoft.com/office/drawing/2010/main" w="12700" cap="flat" cmpd="sng" algn="ctr">
-                <a:solidFill>
-                  <a:schemeClr val="accent1">
-                    <a:shade val="50000"/>
-                  </a:schemeClr>
-                </a:solidFill>
-                <a:prstDash val="solid"/>
-                <a:miter lim="800000"/>
-              </a14:hiddenLine>
-            </a:ext>
-          </a:extLst>
-        </p:spPr>
-        <p:style>
-          <a:lnRef idx="2">
-            <a:schemeClr val="accent1">
-              <a:shade val="50000"/>
-            </a:schemeClr>
-          </a:lnRef>
-          <a:fillRef idx="1">
-            <a:schemeClr val="accent1"/>
-          </a:fillRef>
-          <a:effectRef idx="0">
-            <a:schemeClr val="accent1"/>
-          </a:effectRef>
-          <a:fontRef idx="minor">
-            <a:schemeClr val="lt1"/>
-          </a:fontRef>
-        </p:style>
-        <p:txBody>
-          <a:bodyPr rtlCol="0" anchor="ctr"/>
-          <a:lstStyle/>
-          <a:p>
-            <a:pPr algn="ctr"/>
-            <a:endParaRPr lang="en-US"/>
-          </a:p>
-        </p:txBody>
-      </p:sp>
-      <p:sp>
-        <p:nvSpPr>
-          <p:cNvPr id="2" name="Title 1">
-            <a:extLst>
-              <a:ext uri="{FF2B5EF4-FFF2-40B4-BE49-F238E27FC236}">
-                <a16:creationId xmlns:a16="http://schemas.microsoft.com/office/drawing/2014/main" id="{3B395FC2-8321-7C5C-29AA-B99C08821674}"/>
-              </a:ext>
-            </a:extLst>
-          </p:cNvPr>
-          <p:cNvSpPr>
-            <a:spLocks noGrp="1"/>
-          </p:cNvSpPr>
-          <p:nvPr>
-            <p:ph type="title"/>
-          </p:nvPr>
-        </p:nvSpPr>
-        <p:spPr>
-          <a:xfrm>
-            <a:off x="1297858" y="5457603"/>
-            <a:ext cx="9335728" cy="634181"/>
-          </a:xfrm>
-        </p:spPr>
-        <p:txBody>
-          <a:bodyPr vert="horz" lIns="91440" tIns="45720" rIns="91440" bIns="45720" rtlCol="0" anchor="b">
-            <a:normAutofit/>
-          </a:bodyPr>
-          <a:lstStyle/>
-          <a:p>
-            <a:r>
-              <a:rPr lang="en-US" sz="2800" dirty="0"/>
-              <a:t>Data Analysis: Outliers</a:t>
-            </a:r>
-          </a:p>
-        </p:txBody>
-      </p:sp>
-      <p:sp>
-        <p:nvSpPr>
-          <p:cNvPr id="3" name="Content Placeholder 2">
-            <a:extLst>
-              <a:ext uri="{FF2B5EF4-FFF2-40B4-BE49-F238E27FC236}">
-                <a16:creationId xmlns:a16="http://schemas.microsoft.com/office/drawing/2014/main" id="{24DA2570-282A-3399-BAB1-08B8E114B865}"/>
-              </a:ext>
-            </a:extLst>
-          </p:cNvPr>
-          <p:cNvSpPr>
-            <a:spLocks noGrp="1"/>
-          </p:cNvSpPr>
-          <p:nvPr>
-            <p:ph idx="1"/>
-          </p:nvPr>
-        </p:nvSpPr>
-        <p:spPr>
-          <a:xfrm>
-            <a:off x="1297858" y="6117453"/>
-            <a:ext cx="7359445" cy="440939"/>
-          </a:xfrm>
-        </p:spPr>
-        <p:txBody>
-          <a:bodyPr vert="horz" lIns="91440" tIns="45720" rIns="91440" bIns="45720" rtlCol="0" anchor="t">
-            <a:normAutofit/>
-          </a:bodyPr>
-          <a:lstStyle/>
-          <a:p>
-            <a:pPr marL="0" indent="0">
-              <a:buNone/>
-            </a:pPr>
-            <a:r>
-              <a:rPr lang="en-US" sz="1600" dirty="0"/>
-              <a:t>Outliers are visually evident in the data set. That won’t do!</a:t>
-            </a:r>
-          </a:p>
-        </p:txBody>
-      </p:sp>
-      <p:pic>
-        <p:nvPicPr>
-          <p:cNvPr id="5" name="Picture 4">
-            <a:extLst>
-              <a:ext uri="{FF2B5EF4-FFF2-40B4-BE49-F238E27FC236}">
-                <a16:creationId xmlns:a16="http://schemas.microsoft.com/office/drawing/2014/main" id="{232D2A49-4C4A-AD2D-5CD1-C5A952828DE4}"/>
-              </a:ext>
-            </a:extLst>
-          </p:cNvPr>
-          <p:cNvPicPr>
-            <a:picLocks noChangeAspect="1"/>
-          </p:cNvPicPr>
-          <p:nvPr/>
-        </p:nvPicPr>
-        <p:blipFill rotWithShape="1">
-          <a:blip r:embed="rId2"/>
-          <a:srcRect t="3217" r="-2" b="-2"/>
-          <a:stretch/>
-        </p:blipFill>
-        <p:spPr>
-          <a:xfrm>
-            <a:off x="-14045" y="-2641"/>
-            <a:ext cx="6971606" cy="5149259"/>
-          </a:xfrm>
-          <a:prstGeom prst="rect">
-            <a:avLst/>
-          </a:prstGeom>
-        </p:spPr>
-      </p:pic>
-      <p:sp>
-        <p:nvSpPr>
-          <p:cNvPr id="16" name="Rectangle 15">
-            <a:extLst>
-              <a:ext uri="{FF2B5EF4-FFF2-40B4-BE49-F238E27FC236}">
-                <a16:creationId xmlns:a16="http://schemas.microsoft.com/office/drawing/2014/main" id="{23897094-E24A-4AF2-A248-62AA3C428915}"/>
-              </a:ext>
-              <a:ext uri="{C183D7F6-B498-43B3-948B-1728B52AA6E4}">
-                <adec:decorative xmlns:adec="http://schemas.microsoft.com/office/drawing/2017/decorative" val="1"/>
-              </a:ext>
-            </a:extLst>
-          </p:cNvPr>
-          <p:cNvSpPr>
-            <a:spLocks noGrp="1" noRot="1" noChangeAspect="1" noMove="1" noResize="1" noEditPoints="1" noAdjustHandles="1" noChangeArrowheads="1" noChangeShapeType="1" noTextEdit="1"/>
-          </p:cNvSpPr>
-          <p:nvPr>
-            <p:extLst>
-              <p:ext uri="{386F3935-93C4-4BCD-93E2-E3B085C9AB24}">
-                <p16:designElem xmlns:p16="http://schemas.microsoft.com/office/powerpoint/2015/main" val="1"/>
-              </p:ext>
-            </p:extLst>
-          </p:nvPr>
-        </p:nvSpPr>
-        <p:spPr>
-          <a:xfrm>
-            <a:off x="6957569" y="0"/>
-            <a:ext cx="5234431" cy="5146618"/>
-          </a:xfrm>
-          <a:prstGeom prst="rect">
-            <a:avLst/>
-          </a:prstGeom>
-          <a:ln>
-            <a:noFill/>
-          </a:ln>
-        </p:spPr>
-        <p:style>
-          <a:lnRef idx="2">
-            <a:schemeClr val="accent1">
-              <a:shade val="50000"/>
-            </a:schemeClr>
-          </a:lnRef>
-          <a:fillRef idx="1">
-            <a:schemeClr val="accent1"/>
-          </a:fillRef>
-          <a:effectRef idx="0">
-            <a:schemeClr val="accent1"/>
-          </a:effectRef>
-          <a:fontRef idx="minor">
-            <a:schemeClr val="lt1"/>
-          </a:fontRef>
-        </p:style>
-        <p:txBody>
-          <a:bodyPr rtlCol="0" anchor="ctr"/>
-          <a:lstStyle/>
-          <a:p>
-            <a:pPr algn="ctr"/>
-            <a:endParaRPr lang="en-US"/>
-          </a:p>
-        </p:txBody>
-      </p:sp>
-      <p:pic>
-        <p:nvPicPr>
-          <p:cNvPr id="7" name="Picture 6">
-            <a:extLst>
-              <a:ext uri="{FF2B5EF4-FFF2-40B4-BE49-F238E27FC236}">
-                <a16:creationId xmlns:a16="http://schemas.microsoft.com/office/drawing/2014/main" id="{6C9C9544-A457-2B1A-E9A2-7AEDED5F470B}"/>
-              </a:ext>
-            </a:extLst>
-          </p:cNvPr>
-          <p:cNvPicPr>
-            <a:picLocks noChangeAspect="1"/>
-          </p:cNvPicPr>
-          <p:nvPr/>
-        </p:nvPicPr>
-        <p:blipFill rotWithShape="1">
-          <a:blip r:embed="rId3"/>
-          <a:srcRect t="7067" r="-2" b="3572"/>
-          <a:stretch/>
-        </p:blipFill>
-        <p:spPr>
-          <a:xfrm>
-            <a:off x="7190524" y="230286"/>
-            <a:ext cx="4768527" cy="4686047"/>
-          </a:xfrm>
-          <a:custGeom>
-            <a:avLst/>
-            <a:gdLst/>
-            <a:ahLst/>
-            <a:cxnLst/>
-            <a:rect l="l" t="t" r="r" b="b"/>
-            <a:pathLst>
-              <a:path w="4845018" h="4845018">
-                <a:moveTo>
-                  <a:pt x="2422509" y="0"/>
-                </a:moveTo>
-                <a:cubicBezTo>
-                  <a:pt x="3760424" y="0"/>
-                  <a:pt x="4845018" y="1084594"/>
-                  <a:pt x="4845018" y="2422509"/>
-                </a:cubicBezTo>
-                <a:cubicBezTo>
-                  <a:pt x="4845018" y="3760424"/>
-                  <a:pt x="3760424" y="4845018"/>
-                  <a:pt x="2422509" y="4845018"/>
-                </a:cubicBezTo>
-                <a:cubicBezTo>
-                  <a:pt x="1084594" y="4845018"/>
-                  <a:pt x="0" y="3760424"/>
-                  <a:pt x="0" y="2422509"/>
-                </a:cubicBezTo>
-                <a:cubicBezTo>
-                  <a:pt x="0" y="1084594"/>
-                  <a:pt x="1084594" y="0"/>
-                  <a:pt x="2422509" y="0"/>
-                </a:cubicBezTo>
-                <a:close/>
-              </a:path>
-            </a:pathLst>
-          </a:custGeom>
-        </p:spPr>
-      </p:pic>
-    </p:spTree>
-    <p:extLst>
-      <p:ext uri="{BB962C8B-B14F-4D97-AF65-F5344CB8AC3E}">
-        <p14:creationId xmlns:p14="http://schemas.microsoft.com/office/powerpoint/2010/main" val="2767907557"/>
-      </p:ext>
-    </p:extLst>
-  </p:cSld>
-  <p:clrMapOvr>
-    <a:masterClrMapping/>
-  </p:clrMapOvr>
-</p:sld>
-</file>
-
-<file path=ppt/slides/slide6.xml><?xml version="1.0" encoding="utf-8"?>
-<p:sld xmlns:a="http://schemas.openxmlformats.org/drawingml/2006/main" xmlns:r="http://schemas.openxmlformats.org/officeDocument/2006/relationships" xmlns:p="http://schemas.openxmlformats.org/presentationml/2006/main">
-  <p:cSld>
-    <p:bg>
-      <p:bgPr>
-        <a:solidFill>
-          <a:schemeClr val="bg1"/>
-        </a:solidFill>
-        <a:effectLst/>
-      </p:bgPr>
-    </p:bg>
-    <p:spTree>
-      <p:nvGrpSpPr>
-        <p:cNvPr id="1" name=""/>
-        <p:cNvGrpSpPr/>
-        <p:nvPr/>
-      </p:nvGrpSpPr>
-      <p:grpSpPr>
-        <a:xfrm>
-          <a:off x="0" y="0"/>
-          <a:ext cx="0" cy="0"/>
-          <a:chOff x="0" y="0"/>
-          <a:chExt cx="0" cy="0"/>
-        </a:xfrm>
-      </p:grpSpPr>
       <p:sp useBgFill="1">
         <p:nvSpPr>
           <p:cNvPr id="10" name="Rectangle 9">
@@ -26004,6 +25588,781 @@
     <p:extLst>
       <p:ext uri="{BB962C8B-B14F-4D97-AF65-F5344CB8AC3E}">
         <p14:creationId xmlns:p14="http://schemas.microsoft.com/office/powerpoint/2010/main" val="3993871760"/>
+      </p:ext>
+    </p:extLst>
+  </p:cSld>
+  <p:clrMapOvr>
+    <a:masterClrMapping/>
+  </p:clrMapOvr>
+</p:sld>
+</file>
+
+<file path=ppt/slides/slide6.xml><?xml version="1.0" encoding="utf-8"?>
+<p:sld xmlns:a="http://schemas.openxmlformats.org/drawingml/2006/main" xmlns:r="http://schemas.openxmlformats.org/officeDocument/2006/relationships" xmlns:p="http://schemas.openxmlformats.org/presentationml/2006/main">
+  <p:cSld>
+    <p:bg>
+      <p:bgPr>
+        <a:solidFill>
+          <a:schemeClr val="bg1"/>
+        </a:solidFill>
+        <a:effectLst/>
+      </p:bgPr>
+    </p:bg>
+    <p:spTree>
+      <p:nvGrpSpPr>
+        <p:cNvPr id="1" name=""/>
+        <p:cNvGrpSpPr/>
+        <p:nvPr/>
+      </p:nvGrpSpPr>
+      <p:grpSpPr>
+        <a:xfrm>
+          <a:off x="0" y="0"/>
+          <a:ext cx="0" cy="0"/>
+          <a:chOff x="0" y="0"/>
+          <a:chExt cx="0" cy="0"/>
+        </a:xfrm>
+      </p:grpSpPr>
+      <p:sp>
+        <p:nvSpPr>
+          <p:cNvPr id="12" name="Freeform: Shape 11">
+            <a:extLst>
+              <a:ext uri="{FF2B5EF4-FFF2-40B4-BE49-F238E27FC236}">
+                <a16:creationId xmlns:a16="http://schemas.microsoft.com/office/drawing/2014/main" id="{AE192E3E-68A9-4F36-936C-1C8D0B9EF132}"/>
+              </a:ext>
+              <a:ext uri="{C183D7F6-B498-43B3-948B-1728B52AA6E4}">
+                <adec:decorative xmlns:adec="http://schemas.microsoft.com/office/drawing/2017/decorative" val="1"/>
+              </a:ext>
+            </a:extLst>
+          </p:cNvPr>
+          <p:cNvSpPr>
+            <a:spLocks noGrp="1" noRot="1" noChangeAspect="1" noMove="1" noResize="1" noEditPoints="1" noAdjustHandles="1" noChangeArrowheads="1" noChangeShapeType="1" noTextEdit="1"/>
+          </p:cNvSpPr>
+          <p:nvPr>
+            <p:extLst>
+              <p:ext uri="{386F3935-93C4-4BCD-93E2-E3B085C9AB24}">
+                <p16:designElem xmlns:p16="http://schemas.microsoft.com/office/powerpoint/2015/main" val="1"/>
+              </p:ext>
+            </p:extLst>
+          </p:nvPr>
+        </p:nvSpPr>
+        <p:spPr>
+          <a:xfrm>
+            <a:off x="8803792" y="3455896"/>
+            <a:ext cx="3388208" cy="3406341"/>
+          </a:xfrm>
+          <a:custGeom>
+            <a:avLst/>
+            <a:gdLst>
+              <a:gd name="connsiteX0" fmla="*/ 3388058 w 3388208"/>
+              <a:gd name="connsiteY0" fmla="*/ 0 h 3406341"/>
+              <a:gd name="connsiteX1" fmla="*/ 3388208 w 3388208"/>
+              <a:gd name="connsiteY1" fmla="*/ 0 h 3406341"/>
+              <a:gd name="connsiteX2" fmla="*/ 3388208 w 3388208"/>
+              <a:gd name="connsiteY2" fmla="*/ 3406341 h 3406341"/>
+              <a:gd name="connsiteX3" fmla="*/ 0 w 3388208"/>
+              <a:gd name="connsiteY3" fmla="*/ 3406341 h 3406341"/>
+              <a:gd name="connsiteX4" fmla="*/ 79006 w 3388208"/>
+              <a:gd name="connsiteY4" fmla="*/ 3404386 h 3406341"/>
+              <a:gd name="connsiteX5" fmla="*/ 3383947 w 3388208"/>
+              <a:gd name="connsiteY5" fmla="*/ 164274 h 3406341"/>
+            </a:gdLst>
+            <a:ahLst/>
+            <a:cxnLst>
+              <a:cxn ang="0">
+                <a:pos x="connsiteX0" y="connsiteY0"/>
+              </a:cxn>
+              <a:cxn ang="0">
+                <a:pos x="connsiteX1" y="connsiteY1"/>
+              </a:cxn>
+              <a:cxn ang="0">
+                <a:pos x="connsiteX2" y="connsiteY2"/>
+              </a:cxn>
+              <a:cxn ang="0">
+                <a:pos x="connsiteX3" y="connsiteY3"/>
+              </a:cxn>
+              <a:cxn ang="0">
+                <a:pos x="connsiteX4" y="connsiteY4"/>
+              </a:cxn>
+              <a:cxn ang="0">
+                <a:pos x="connsiteX5" y="connsiteY5"/>
+              </a:cxn>
+            </a:cxnLst>
+            <a:rect l="l" t="t" r="r" b="b"/>
+            <a:pathLst>
+              <a:path w="3388208" h="3406341">
+                <a:moveTo>
+                  <a:pt x="3388058" y="0"/>
+                </a:moveTo>
+                <a:lnTo>
+                  <a:pt x="3388208" y="0"/>
+                </a:lnTo>
+                <a:lnTo>
+                  <a:pt x="3388208" y="3406341"/>
+                </a:lnTo>
+                <a:lnTo>
+                  <a:pt x="0" y="3406341"/>
+                </a:lnTo>
+                <a:lnTo>
+                  <a:pt x="79006" y="3404386"/>
+                </a:lnTo>
+                <a:cubicBezTo>
+                  <a:pt x="1864742" y="3315784"/>
+                  <a:pt x="3296223" y="1912901"/>
+                  <a:pt x="3383947" y="164274"/>
+                </a:cubicBezTo>
+                <a:close/>
+              </a:path>
+            </a:pathLst>
+          </a:custGeom>
+          <a:solidFill>
+            <a:schemeClr val="accent5"/>
+          </a:solidFill>
+          <a:ln>
+            <a:noFill/>
+          </a:ln>
+        </p:spPr>
+        <p:style>
+          <a:lnRef idx="2">
+            <a:schemeClr val="accent1">
+              <a:shade val="50000"/>
+            </a:schemeClr>
+          </a:lnRef>
+          <a:fillRef idx="1">
+            <a:schemeClr val="accent1"/>
+          </a:fillRef>
+          <a:effectRef idx="0">
+            <a:schemeClr val="accent1"/>
+          </a:effectRef>
+          <a:fontRef idx="minor">
+            <a:schemeClr val="lt1"/>
+          </a:fontRef>
+        </p:style>
+        <p:txBody>
+          <a:bodyPr wrap="square" rtlCol="0" anchor="ctr">
+            <a:noAutofit/>
+          </a:bodyPr>
+          <a:lstStyle/>
+          <a:p>
+            <a:pPr algn="ctr"/>
+            <a:endParaRPr lang="en-US"/>
+          </a:p>
+        </p:txBody>
+      </p:sp>
+      <p:sp useBgFill="1">
+        <p:nvSpPr>
+          <p:cNvPr id="14" name="Rectangle 13">
+            <a:extLst>
+              <a:ext uri="{FF2B5EF4-FFF2-40B4-BE49-F238E27FC236}">
+                <a16:creationId xmlns:a16="http://schemas.microsoft.com/office/drawing/2014/main" id="{8FB1897B-3F14-4996-810D-54D93A629F41}"/>
+              </a:ext>
+              <a:ext uri="{C183D7F6-B498-43B3-948B-1728B52AA6E4}">
+                <adec:decorative xmlns:adec="http://schemas.microsoft.com/office/drawing/2017/decorative" val="1"/>
+              </a:ext>
+            </a:extLst>
+          </p:cNvPr>
+          <p:cNvSpPr>
+            <a:spLocks noGrp="1" noRot="1" noChangeAspect="1" noMove="1" noResize="1" noEditPoints="1" noAdjustHandles="1" noChangeArrowheads="1" noChangeShapeType="1" noTextEdit="1"/>
+          </p:cNvSpPr>
+          <p:nvPr>
+            <p:extLst>
+              <p:ext uri="{386F3935-93C4-4BCD-93E2-E3B085C9AB24}">
+                <p16:designElem xmlns:p16="http://schemas.microsoft.com/office/powerpoint/2015/main" val="1"/>
+              </p:ext>
+            </p:extLst>
+          </p:nvPr>
+        </p:nvSpPr>
+        <p:spPr>
+          <a:xfrm>
+            <a:off x="0" y="0"/>
+            <a:ext cx="12192000" cy="6858000"/>
+          </a:xfrm>
+          <a:prstGeom prst="rect">
+            <a:avLst/>
+          </a:prstGeom>
+          <a:ln w="12700" cap="flat" cmpd="sng" algn="ctr">
+            <a:noFill/>
+            <a:prstDash val="solid"/>
+            <a:miter lim="800000"/>
+          </a:ln>
+          <a:effectLst/>
+          <a:extLst>
+            <a:ext uri="{91240B29-F687-4F45-9708-019B960494DF}">
+              <a14:hiddenLine xmlns:a14="http://schemas.microsoft.com/office/drawing/2010/main" w="12700" cap="flat" cmpd="sng" algn="ctr">
+                <a:solidFill>
+                  <a:schemeClr val="accent1">
+                    <a:shade val="50000"/>
+                  </a:schemeClr>
+                </a:solidFill>
+                <a:prstDash val="solid"/>
+                <a:miter lim="800000"/>
+              </a14:hiddenLine>
+            </a:ext>
+          </a:extLst>
+        </p:spPr>
+        <p:style>
+          <a:lnRef idx="2">
+            <a:schemeClr val="accent1">
+              <a:shade val="50000"/>
+            </a:schemeClr>
+          </a:lnRef>
+          <a:fillRef idx="1">
+            <a:schemeClr val="accent1"/>
+          </a:fillRef>
+          <a:effectRef idx="0">
+            <a:schemeClr val="accent1"/>
+          </a:effectRef>
+          <a:fontRef idx="minor">
+            <a:schemeClr val="lt1"/>
+          </a:fontRef>
+        </p:style>
+        <p:txBody>
+          <a:bodyPr rtlCol="0" anchor="ctr"/>
+          <a:lstStyle/>
+          <a:p>
+            <a:pPr algn="ctr"/>
+            <a:endParaRPr lang="en-US"/>
+          </a:p>
+        </p:txBody>
+      </p:sp>
+      <p:sp>
+        <p:nvSpPr>
+          <p:cNvPr id="2" name="Title 1">
+            <a:extLst>
+              <a:ext uri="{FF2B5EF4-FFF2-40B4-BE49-F238E27FC236}">
+                <a16:creationId xmlns:a16="http://schemas.microsoft.com/office/drawing/2014/main" id="{3B395FC2-8321-7C5C-29AA-B99C08821674}"/>
+              </a:ext>
+            </a:extLst>
+          </p:cNvPr>
+          <p:cNvSpPr>
+            <a:spLocks noGrp="1"/>
+          </p:cNvSpPr>
+          <p:nvPr>
+            <p:ph type="title"/>
+          </p:nvPr>
+        </p:nvSpPr>
+        <p:spPr>
+          <a:xfrm>
+            <a:off x="1297858" y="5457603"/>
+            <a:ext cx="9335728" cy="634181"/>
+          </a:xfrm>
+        </p:spPr>
+        <p:txBody>
+          <a:bodyPr vert="horz" lIns="91440" tIns="45720" rIns="91440" bIns="45720" rtlCol="0" anchor="b">
+            <a:normAutofit/>
+          </a:bodyPr>
+          <a:lstStyle/>
+          <a:p>
+            <a:r>
+              <a:rPr lang="en-US" sz="2800" dirty="0"/>
+              <a:t>Data Analysis: Outliers</a:t>
+            </a:r>
+          </a:p>
+        </p:txBody>
+      </p:sp>
+      <p:sp>
+        <p:nvSpPr>
+          <p:cNvPr id="3" name="Content Placeholder 2">
+            <a:extLst>
+              <a:ext uri="{FF2B5EF4-FFF2-40B4-BE49-F238E27FC236}">
+                <a16:creationId xmlns:a16="http://schemas.microsoft.com/office/drawing/2014/main" id="{24DA2570-282A-3399-BAB1-08B8E114B865}"/>
+              </a:ext>
+            </a:extLst>
+          </p:cNvPr>
+          <p:cNvSpPr>
+            <a:spLocks noGrp="1"/>
+          </p:cNvSpPr>
+          <p:nvPr>
+            <p:ph idx="1"/>
+          </p:nvPr>
+        </p:nvSpPr>
+        <p:spPr>
+          <a:xfrm>
+            <a:off x="1297858" y="6117453"/>
+            <a:ext cx="7359445" cy="440939"/>
+          </a:xfrm>
+        </p:spPr>
+        <p:txBody>
+          <a:bodyPr vert="horz" lIns="91440" tIns="45720" rIns="91440" bIns="45720" rtlCol="0" anchor="t">
+            <a:normAutofit/>
+          </a:bodyPr>
+          <a:lstStyle/>
+          <a:p>
+            <a:pPr marL="0" indent="0">
+              <a:buNone/>
+            </a:pPr>
+            <a:r>
+              <a:rPr lang="en-US" sz="1600" dirty="0"/>
+              <a:t>Outliers are visually evident in the data set. That won’t do!</a:t>
+            </a:r>
+          </a:p>
+        </p:txBody>
+      </p:sp>
+      <p:pic>
+        <p:nvPicPr>
+          <p:cNvPr id="5" name="Picture 4">
+            <a:extLst>
+              <a:ext uri="{FF2B5EF4-FFF2-40B4-BE49-F238E27FC236}">
+                <a16:creationId xmlns:a16="http://schemas.microsoft.com/office/drawing/2014/main" id="{232D2A49-4C4A-AD2D-5CD1-C5A952828DE4}"/>
+              </a:ext>
+            </a:extLst>
+          </p:cNvPr>
+          <p:cNvPicPr>
+            <a:picLocks noChangeAspect="1"/>
+          </p:cNvPicPr>
+          <p:nvPr/>
+        </p:nvPicPr>
+        <p:blipFill rotWithShape="1">
+          <a:blip r:embed="rId2"/>
+          <a:srcRect t="3217" r="-2" b="-2"/>
+          <a:stretch/>
+        </p:blipFill>
+        <p:spPr>
+          <a:xfrm>
+            <a:off x="-14045" y="-2641"/>
+            <a:ext cx="6971606" cy="5149259"/>
+          </a:xfrm>
+          <a:prstGeom prst="rect">
+            <a:avLst/>
+          </a:prstGeom>
+        </p:spPr>
+      </p:pic>
+      <p:sp>
+        <p:nvSpPr>
+          <p:cNvPr id="16" name="Rectangle 15">
+            <a:extLst>
+              <a:ext uri="{FF2B5EF4-FFF2-40B4-BE49-F238E27FC236}">
+                <a16:creationId xmlns:a16="http://schemas.microsoft.com/office/drawing/2014/main" id="{23897094-E24A-4AF2-A248-62AA3C428915}"/>
+              </a:ext>
+              <a:ext uri="{C183D7F6-B498-43B3-948B-1728B52AA6E4}">
+                <adec:decorative xmlns:adec="http://schemas.microsoft.com/office/drawing/2017/decorative" val="1"/>
+              </a:ext>
+            </a:extLst>
+          </p:cNvPr>
+          <p:cNvSpPr>
+            <a:spLocks noGrp="1" noRot="1" noChangeAspect="1" noMove="1" noResize="1" noEditPoints="1" noAdjustHandles="1" noChangeArrowheads="1" noChangeShapeType="1" noTextEdit="1"/>
+          </p:cNvSpPr>
+          <p:nvPr>
+            <p:extLst>
+              <p:ext uri="{386F3935-93C4-4BCD-93E2-E3B085C9AB24}">
+                <p16:designElem xmlns:p16="http://schemas.microsoft.com/office/powerpoint/2015/main" val="1"/>
+              </p:ext>
+            </p:extLst>
+          </p:nvPr>
+        </p:nvSpPr>
+        <p:spPr>
+          <a:xfrm>
+            <a:off x="6957569" y="0"/>
+            <a:ext cx="5234431" cy="5146618"/>
+          </a:xfrm>
+          <a:prstGeom prst="rect">
+            <a:avLst/>
+          </a:prstGeom>
+          <a:ln>
+            <a:noFill/>
+          </a:ln>
+        </p:spPr>
+        <p:style>
+          <a:lnRef idx="2">
+            <a:schemeClr val="accent1">
+              <a:shade val="50000"/>
+            </a:schemeClr>
+          </a:lnRef>
+          <a:fillRef idx="1">
+            <a:schemeClr val="accent1"/>
+          </a:fillRef>
+          <a:effectRef idx="0">
+            <a:schemeClr val="accent1"/>
+          </a:effectRef>
+          <a:fontRef idx="minor">
+            <a:schemeClr val="lt1"/>
+          </a:fontRef>
+        </p:style>
+        <p:txBody>
+          <a:bodyPr rtlCol="0" anchor="ctr"/>
+          <a:lstStyle/>
+          <a:p>
+            <a:pPr algn="ctr"/>
+            <a:endParaRPr lang="en-US"/>
+          </a:p>
+        </p:txBody>
+      </p:sp>
+      <p:pic>
+        <p:nvPicPr>
+          <p:cNvPr id="7" name="Picture 6">
+            <a:extLst>
+              <a:ext uri="{FF2B5EF4-FFF2-40B4-BE49-F238E27FC236}">
+                <a16:creationId xmlns:a16="http://schemas.microsoft.com/office/drawing/2014/main" id="{6C9C9544-A457-2B1A-E9A2-7AEDED5F470B}"/>
+              </a:ext>
+            </a:extLst>
+          </p:cNvPr>
+          <p:cNvPicPr>
+            <a:picLocks noChangeAspect="1"/>
+          </p:cNvPicPr>
+          <p:nvPr/>
+        </p:nvPicPr>
+        <p:blipFill rotWithShape="1">
+          <a:blip r:embed="rId3"/>
+          <a:srcRect t="7067" r="-2" b="3572"/>
+          <a:stretch/>
+        </p:blipFill>
+        <p:spPr>
+          <a:xfrm>
+            <a:off x="7190524" y="230286"/>
+            <a:ext cx="4768527" cy="4686047"/>
+          </a:xfrm>
+          <a:custGeom>
+            <a:avLst/>
+            <a:gdLst/>
+            <a:ahLst/>
+            <a:cxnLst/>
+            <a:rect l="l" t="t" r="r" b="b"/>
+            <a:pathLst>
+              <a:path w="4845018" h="4845018">
+                <a:moveTo>
+                  <a:pt x="2422509" y="0"/>
+                </a:moveTo>
+                <a:cubicBezTo>
+                  <a:pt x="3760424" y="0"/>
+                  <a:pt x="4845018" y="1084594"/>
+                  <a:pt x="4845018" y="2422509"/>
+                </a:cubicBezTo>
+                <a:cubicBezTo>
+                  <a:pt x="4845018" y="3760424"/>
+                  <a:pt x="3760424" y="4845018"/>
+                  <a:pt x="2422509" y="4845018"/>
+                </a:cubicBezTo>
+                <a:cubicBezTo>
+                  <a:pt x="1084594" y="4845018"/>
+                  <a:pt x="0" y="3760424"/>
+                  <a:pt x="0" y="2422509"/>
+                </a:cubicBezTo>
+                <a:cubicBezTo>
+                  <a:pt x="0" y="1084594"/>
+                  <a:pt x="1084594" y="0"/>
+                  <a:pt x="2422509" y="0"/>
+                </a:cubicBezTo>
+                <a:close/>
+              </a:path>
+            </a:pathLst>
+          </a:custGeom>
+        </p:spPr>
+      </p:pic>
+      <p:sp>
+        <p:nvSpPr>
+          <p:cNvPr id="15" name="Oval 14">
+            <a:extLst>
+              <a:ext uri="{FF2B5EF4-FFF2-40B4-BE49-F238E27FC236}">
+                <a16:creationId xmlns:a16="http://schemas.microsoft.com/office/drawing/2014/main" id="{40FC04D0-C60B-B61E-CD7F-9C59F443C041}"/>
+              </a:ext>
+            </a:extLst>
+          </p:cNvPr>
+          <p:cNvSpPr/>
+          <p:nvPr/>
+        </p:nvSpPr>
+        <p:spPr>
+          <a:xfrm>
+            <a:off x="8195417" y="4221622"/>
+            <a:ext cx="282011" cy="264920"/>
+          </a:xfrm>
+          <a:prstGeom prst="ellipse">
+            <a:avLst/>
+          </a:prstGeom>
+          <a:noFill/>
+          <a:ln>
+            <a:solidFill>
+              <a:srgbClr val="FF0000"/>
+            </a:solidFill>
+          </a:ln>
+        </p:spPr>
+        <p:style>
+          <a:lnRef idx="2">
+            <a:schemeClr val="accent1">
+              <a:shade val="50000"/>
+            </a:schemeClr>
+          </a:lnRef>
+          <a:fillRef idx="1">
+            <a:schemeClr val="accent1"/>
+          </a:fillRef>
+          <a:effectRef idx="0">
+            <a:schemeClr val="accent1"/>
+          </a:effectRef>
+          <a:fontRef idx="minor">
+            <a:schemeClr val="lt1"/>
+          </a:fontRef>
+        </p:style>
+        <p:txBody>
+          <a:bodyPr rtlCol="0" anchor="ctr"/>
+          <a:lstStyle/>
+          <a:p>
+            <a:pPr algn="ctr"/>
+            <a:endParaRPr lang="en-US"/>
+          </a:p>
+        </p:txBody>
+      </p:sp>
+      <p:sp>
+        <p:nvSpPr>
+          <p:cNvPr id="18" name="Oval 17">
+            <a:extLst>
+              <a:ext uri="{FF2B5EF4-FFF2-40B4-BE49-F238E27FC236}">
+                <a16:creationId xmlns:a16="http://schemas.microsoft.com/office/drawing/2014/main" id="{009348FB-6536-0982-9B56-A79767C31B23}"/>
+              </a:ext>
+            </a:extLst>
+          </p:cNvPr>
+          <p:cNvSpPr/>
+          <p:nvPr/>
+        </p:nvSpPr>
+        <p:spPr>
+          <a:xfrm>
+            <a:off x="9843331" y="2424760"/>
+            <a:ext cx="282011" cy="264920"/>
+          </a:xfrm>
+          <a:prstGeom prst="ellipse">
+            <a:avLst/>
+          </a:prstGeom>
+          <a:noFill/>
+          <a:ln>
+            <a:solidFill>
+              <a:srgbClr val="FF0000"/>
+            </a:solidFill>
+          </a:ln>
+        </p:spPr>
+        <p:style>
+          <a:lnRef idx="2">
+            <a:schemeClr val="accent1">
+              <a:shade val="50000"/>
+            </a:schemeClr>
+          </a:lnRef>
+          <a:fillRef idx="1">
+            <a:schemeClr val="accent1"/>
+          </a:fillRef>
+          <a:effectRef idx="0">
+            <a:schemeClr val="accent1"/>
+          </a:effectRef>
+          <a:fontRef idx="minor">
+            <a:schemeClr val="lt1"/>
+          </a:fontRef>
+        </p:style>
+        <p:txBody>
+          <a:bodyPr rtlCol="0" anchor="ctr"/>
+          <a:lstStyle/>
+          <a:p>
+            <a:pPr algn="ctr"/>
+            <a:endParaRPr lang="en-US" dirty="0"/>
+          </a:p>
+        </p:txBody>
+      </p:sp>
+      <p:sp>
+        <p:nvSpPr>
+          <p:cNvPr id="19" name="Oval 18">
+            <a:extLst>
+              <a:ext uri="{FF2B5EF4-FFF2-40B4-BE49-F238E27FC236}">
+                <a16:creationId xmlns:a16="http://schemas.microsoft.com/office/drawing/2014/main" id="{6A131D22-3566-A8BA-C9B3-5F8DED6B210F}"/>
+              </a:ext>
+            </a:extLst>
+          </p:cNvPr>
+          <p:cNvSpPr/>
+          <p:nvPr/>
+        </p:nvSpPr>
+        <p:spPr>
+          <a:xfrm>
+            <a:off x="11157959" y="962826"/>
+            <a:ext cx="282011" cy="264920"/>
+          </a:xfrm>
+          <a:prstGeom prst="ellipse">
+            <a:avLst/>
+          </a:prstGeom>
+          <a:noFill/>
+          <a:ln>
+            <a:solidFill>
+              <a:srgbClr val="FF0000"/>
+            </a:solidFill>
+          </a:ln>
+        </p:spPr>
+        <p:style>
+          <a:lnRef idx="2">
+            <a:schemeClr val="accent1">
+              <a:shade val="50000"/>
+            </a:schemeClr>
+          </a:lnRef>
+          <a:fillRef idx="1">
+            <a:schemeClr val="accent1"/>
+          </a:fillRef>
+          <a:effectRef idx="0">
+            <a:schemeClr val="accent1"/>
+          </a:effectRef>
+          <a:fontRef idx="minor">
+            <a:schemeClr val="lt1"/>
+          </a:fontRef>
+        </p:style>
+        <p:txBody>
+          <a:bodyPr rtlCol="0" anchor="ctr"/>
+          <a:lstStyle/>
+          <a:p>
+            <a:pPr algn="ctr"/>
+            <a:endParaRPr lang="en-US"/>
+          </a:p>
+        </p:txBody>
+      </p:sp>
+      <p:sp>
+        <p:nvSpPr>
+          <p:cNvPr id="22" name="Oval 21">
+            <a:extLst>
+              <a:ext uri="{FF2B5EF4-FFF2-40B4-BE49-F238E27FC236}">
+                <a16:creationId xmlns:a16="http://schemas.microsoft.com/office/drawing/2014/main" id="{A9A3E875-A5F9-C39E-B95D-7724472CDCC2}"/>
+              </a:ext>
+            </a:extLst>
+          </p:cNvPr>
+          <p:cNvSpPr/>
+          <p:nvPr/>
+        </p:nvSpPr>
+        <p:spPr>
+          <a:xfrm>
+            <a:off x="9640088" y="2868205"/>
+            <a:ext cx="282011" cy="264920"/>
+          </a:xfrm>
+          <a:prstGeom prst="ellipse">
+            <a:avLst/>
+          </a:prstGeom>
+          <a:noFill/>
+          <a:ln>
+            <a:solidFill>
+              <a:srgbClr val="FF0000"/>
+            </a:solidFill>
+          </a:ln>
+        </p:spPr>
+        <p:style>
+          <a:lnRef idx="2">
+            <a:schemeClr val="accent1">
+              <a:shade val="50000"/>
+            </a:schemeClr>
+          </a:lnRef>
+          <a:fillRef idx="1">
+            <a:schemeClr val="accent1"/>
+          </a:fillRef>
+          <a:effectRef idx="0">
+            <a:schemeClr val="accent1"/>
+          </a:effectRef>
+          <a:fontRef idx="minor">
+            <a:schemeClr val="lt1"/>
+          </a:fontRef>
+        </p:style>
+        <p:txBody>
+          <a:bodyPr rtlCol="0" anchor="ctr"/>
+          <a:lstStyle/>
+          <a:p>
+            <a:pPr algn="ctr"/>
+            <a:endParaRPr lang="en-US"/>
+          </a:p>
+        </p:txBody>
+      </p:sp>
+      <p:sp>
+        <p:nvSpPr>
+          <p:cNvPr id="23" name="Oval 22">
+            <a:extLst>
+              <a:ext uri="{FF2B5EF4-FFF2-40B4-BE49-F238E27FC236}">
+                <a16:creationId xmlns:a16="http://schemas.microsoft.com/office/drawing/2014/main" id="{78B30DF0-073C-BE33-A3CB-64EDD7A7EEE9}"/>
+              </a:ext>
+            </a:extLst>
+          </p:cNvPr>
+          <p:cNvSpPr/>
+          <p:nvPr/>
+        </p:nvSpPr>
+        <p:spPr>
+          <a:xfrm>
+            <a:off x="4836574" y="4089162"/>
+            <a:ext cx="282011" cy="264920"/>
+          </a:xfrm>
+          <a:prstGeom prst="ellipse">
+            <a:avLst/>
+          </a:prstGeom>
+          <a:noFill/>
+          <a:ln>
+            <a:solidFill>
+              <a:srgbClr val="FF0000"/>
+            </a:solidFill>
+          </a:ln>
+        </p:spPr>
+        <p:style>
+          <a:lnRef idx="2">
+            <a:schemeClr val="accent1">
+              <a:shade val="50000"/>
+            </a:schemeClr>
+          </a:lnRef>
+          <a:fillRef idx="1">
+            <a:schemeClr val="accent1"/>
+          </a:fillRef>
+          <a:effectRef idx="0">
+            <a:schemeClr val="accent1"/>
+          </a:effectRef>
+          <a:fontRef idx="minor">
+            <a:schemeClr val="lt1"/>
+          </a:fontRef>
+        </p:style>
+        <p:txBody>
+          <a:bodyPr rtlCol="0" anchor="ctr"/>
+          <a:lstStyle/>
+          <a:p>
+            <a:pPr algn="ctr"/>
+            <a:endParaRPr lang="en-US"/>
+          </a:p>
+        </p:txBody>
+      </p:sp>
+      <p:sp>
+        <p:nvSpPr>
+          <p:cNvPr id="24" name="Oval 23">
+            <a:extLst>
+              <a:ext uri="{FF2B5EF4-FFF2-40B4-BE49-F238E27FC236}">
+                <a16:creationId xmlns:a16="http://schemas.microsoft.com/office/drawing/2014/main" id="{8AE8A45A-05C3-07FD-3CFE-37BB968DB0A8}"/>
+              </a:ext>
+            </a:extLst>
+          </p:cNvPr>
+          <p:cNvSpPr/>
+          <p:nvPr/>
+        </p:nvSpPr>
+        <p:spPr>
+          <a:xfrm>
+            <a:off x="2227604" y="1066424"/>
+            <a:ext cx="282011" cy="264920"/>
+          </a:xfrm>
+          <a:prstGeom prst="ellipse">
+            <a:avLst/>
+          </a:prstGeom>
+          <a:noFill/>
+          <a:ln>
+            <a:solidFill>
+              <a:srgbClr val="FF0000"/>
+            </a:solidFill>
+          </a:ln>
+        </p:spPr>
+        <p:style>
+          <a:lnRef idx="2">
+            <a:schemeClr val="accent1">
+              <a:shade val="50000"/>
+            </a:schemeClr>
+          </a:lnRef>
+          <a:fillRef idx="1">
+            <a:schemeClr val="accent1"/>
+          </a:fillRef>
+          <a:effectRef idx="0">
+            <a:schemeClr val="accent1"/>
+          </a:effectRef>
+          <a:fontRef idx="minor">
+            <a:schemeClr val="lt1"/>
+          </a:fontRef>
+        </p:style>
+        <p:txBody>
+          <a:bodyPr rtlCol="0" anchor="ctr"/>
+          <a:lstStyle/>
+          <a:p>
+            <a:pPr algn="ctr"/>
+            <a:endParaRPr lang="en-US"/>
+          </a:p>
+        </p:txBody>
+      </p:sp>
+    </p:spTree>
+    <p:extLst>
+      <p:ext uri="{BB962C8B-B14F-4D97-AF65-F5344CB8AC3E}">
+        <p14:creationId xmlns:p14="http://schemas.microsoft.com/office/powerpoint/2010/main" val="2767907557"/>
       </p:ext>
     </p:extLst>
   </p:cSld>

</xml_diff>

<commit_message>
small formatting changes ds 210
</commit_message>
<xml_diff>
--- a/DS_210/final/DS 210.pptx
+++ b/DS_210/final/DS 210.pptx
@@ -5649,7 +5649,13 @@
     </dgm:pt>
     <dgm:pt modelId="{481DC3DE-C970-44D8-A2A1-FC1AEB75022F}">
       <dgm:prSet/>
-      <dgm:spPr/>
+      <dgm:spPr>
+        <a:solidFill>
+          <a:schemeClr val="accent6">
+            <a:lumMod val="75000"/>
+          </a:schemeClr>
+        </a:solidFill>
+      </dgm:spPr>
       <dgm:t>
         <a:bodyPr/>
         <a:lstStyle/>
@@ -6083,7 +6089,7 @@
       <dgm:spPr/>
     </dgm:pt>
     <dgm:pt modelId="{0C0FBAD5-8BAA-4473-BAD0-1AB146AECBA9}" type="pres">
-      <dgm:prSet presAssocID="{481DC3DE-C970-44D8-A2A1-FC1AEB75022F}" presName="parentText" presStyleLbl="node1" presStyleIdx="5" presStyleCnt="6">
+      <dgm:prSet presAssocID="{481DC3DE-C970-44D8-A2A1-FC1AEB75022F}" presName="parentText" presStyleLbl="node1" presStyleIdx="5" presStyleCnt="6" custLinFactX="6754" custLinFactNeighborX="100000">
         <dgm:presLayoutVars>
           <dgm:chMax val="0"/>
           <dgm:bulletEnabled val="1"/>
@@ -8808,18 +8814,15 @@
       </dsp:nvSpPr>
       <dsp:spPr>
         <a:xfrm>
-          <a:off x="386541" y="4883782"/>
+          <a:off x="1138581" y="4883782"/>
           <a:ext cx="5411584" cy="383760"/>
         </a:xfrm>
         <a:prstGeom prst="roundRect">
           <a:avLst/>
         </a:prstGeom>
         <a:solidFill>
-          <a:schemeClr val="accent1">
-            <a:hueOff val="0"/>
-            <a:satOff val="0"/>
-            <a:lumOff val="0"/>
-            <a:alphaOff val="0"/>
+          <a:schemeClr val="accent6">
+            <a:lumMod val="75000"/>
           </a:schemeClr>
         </a:solidFill>
         <a:ln w="12700" cap="flat" cmpd="sng" algn="ctr">
@@ -8875,7 +8878,7 @@
         </a:p>
       </dsp:txBody>
       <dsp:txXfrm>
-        <a:off x="405275" y="4902516"/>
+        <a:off x="1157315" y="4902516"/>
         <a:ext cx="5374116" cy="346292"/>
       </dsp:txXfrm>
     </dsp:sp>
@@ -23030,7 +23033,7 @@
             <p:ph idx="1"/>
             <p:extLst>
               <p:ext uri="{D42A27DB-BD31-4B8C-83A1-F6EECF244321}">
-                <p14:modId xmlns:p14="http://schemas.microsoft.com/office/powerpoint/2010/main" val="1296916387"/>
+                <p14:modId xmlns:p14="http://schemas.microsoft.com/office/powerpoint/2010/main" val="4070357114"/>
               </p:ext>
             </p:extLst>
           </p:nvPr>

</xml_diff>

<commit_message>
add ds 210 final
</commit_message>
<xml_diff>
--- a/DS_210/final/DS 210.pptx
+++ b/DS_210/final/DS 210.pptx
@@ -15433,7 +15433,7 @@
           <a:p>
             <a:fld id="{8C28A28C-4C6A-46EA-90C0-4EE0B89CC5C7}" type="datetimeFigureOut">
               <a:rPr lang="en-US" smtClean="0"/>
-              <a:t>5/11/22</a:t>
+              <a:t>5/12/22</a:t>
             </a:fld>
             <a:endParaRPr lang="en-US" dirty="0"/>
           </a:p>
@@ -15631,7 +15631,7 @@
           <a:p>
             <a:fld id="{8C28A28C-4C6A-46EA-90C0-4EE0B89CC5C7}" type="datetimeFigureOut">
               <a:rPr lang="en-US" smtClean="0"/>
-              <a:t>5/11/22</a:t>
+              <a:t>5/12/22</a:t>
             </a:fld>
             <a:endParaRPr lang="en-US"/>
           </a:p>
@@ -15839,7 +15839,7 @@
           <a:p>
             <a:fld id="{8C28A28C-4C6A-46EA-90C0-4EE0B89CC5C7}" type="datetimeFigureOut">
               <a:rPr lang="en-US" smtClean="0"/>
-              <a:t>5/11/22</a:t>
+              <a:t>5/12/22</a:t>
             </a:fld>
             <a:endParaRPr lang="en-US"/>
           </a:p>
@@ -16037,7 +16037,7 @@
           <a:p>
             <a:fld id="{8C28A28C-4C6A-46EA-90C0-4EE0B89CC5C7}" type="datetimeFigureOut">
               <a:rPr lang="en-US" smtClean="0"/>
-              <a:t>5/11/22</a:t>
+              <a:t>5/12/22</a:t>
             </a:fld>
             <a:endParaRPr lang="en-US"/>
           </a:p>
@@ -16314,7 +16314,7 @@
           <a:p>
             <a:fld id="{8C28A28C-4C6A-46EA-90C0-4EE0B89CC5C7}" type="datetimeFigureOut">
               <a:rPr lang="en-US" smtClean="0"/>
-              <a:t>5/11/22</a:t>
+              <a:t>5/12/22</a:t>
             </a:fld>
             <a:endParaRPr lang="en-US"/>
           </a:p>
@@ -16579,7 +16579,7 @@
           <a:p>
             <a:fld id="{8C28A28C-4C6A-46EA-90C0-4EE0B89CC5C7}" type="datetimeFigureOut">
               <a:rPr lang="en-US" smtClean="0"/>
-              <a:t>5/11/22</a:t>
+              <a:t>5/12/22</a:t>
             </a:fld>
             <a:endParaRPr lang="en-US"/>
           </a:p>
@@ -16991,7 +16991,7 @@
           <a:p>
             <a:fld id="{8C28A28C-4C6A-46EA-90C0-4EE0B89CC5C7}" type="datetimeFigureOut">
               <a:rPr lang="en-US" smtClean="0"/>
-              <a:t>5/11/22</a:t>
+              <a:t>5/12/22</a:t>
             </a:fld>
             <a:endParaRPr lang="en-US"/>
           </a:p>
@@ -17132,7 +17132,7 @@
           <a:p>
             <a:fld id="{8C28A28C-4C6A-46EA-90C0-4EE0B89CC5C7}" type="datetimeFigureOut">
               <a:rPr lang="en-US" smtClean="0"/>
-              <a:t>5/11/22</a:t>
+              <a:t>5/12/22</a:t>
             </a:fld>
             <a:endParaRPr lang="en-US"/>
           </a:p>
@@ -17245,7 +17245,7 @@
           <a:p>
             <a:fld id="{8C28A28C-4C6A-46EA-90C0-4EE0B89CC5C7}" type="datetimeFigureOut">
               <a:rPr lang="en-US" smtClean="0"/>
-              <a:t>5/11/22</a:t>
+              <a:t>5/12/22</a:t>
             </a:fld>
             <a:endParaRPr lang="en-US"/>
           </a:p>
@@ -17558,7 +17558,7 @@
           <a:p>
             <a:fld id="{8C28A28C-4C6A-46EA-90C0-4EE0B89CC5C7}" type="datetimeFigureOut">
               <a:rPr lang="en-US" smtClean="0"/>
-              <a:t>5/11/22</a:t>
+              <a:t>5/12/22</a:t>
             </a:fld>
             <a:endParaRPr lang="en-US"/>
           </a:p>
@@ -17846,7 +17846,7 @@
           <a:p>
             <a:fld id="{8C28A28C-4C6A-46EA-90C0-4EE0B89CC5C7}" type="datetimeFigureOut">
               <a:rPr lang="en-US" smtClean="0"/>
-              <a:t>5/11/22</a:t>
+              <a:t>5/12/22</a:t>
             </a:fld>
             <a:endParaRPr lang="en-US"/>
           </a:p>
@@ -18201,7 +18201,7 @@
             <a:fld id="{8C28A28C-4C6A-46EA-90C0-4EE0B89CC5C7}" type="datetimeFigureOut">
               <a:rPr lang="en-US" smtClean="0"/>
               <a:pPr/>
-              <a:t>5/11/22</a:t>
+              <a:t>5/12/22</a:t>
             </a:fld>
             <a:endParaRPr lang="en-US" dirty="0"/>
           </a:p>
@@ -19734,7 +19734,7 @@
         </p:blipFill>
         <p:spPr>
           <a:xfrm>
-            <a:off x="6146464" y="908546"/>
+            <a:off x="6146464" y="931406"/>
             <a:ext cx="4788861" cy="5040907"/>
           </a:xfrm>
           <a:prstGeom prst="rect">
@@ -20177,7 +20177,7 @@
         </p:blipFill>
         <p:spPr>
           <a:xfrm>
-            <a:off x="6776934" y="1344119"/>
+            <a:off x="6776934" y="1389839"/>
             <a:ext cx="4378597" cy="799094"/>
           </a:xfrm>
           <a:prstGeom prst="rect">
@@ -27718,7 +27718,7 @@
         </p:blipFill>
         <p:spPr>
           <a:xfrm>
-            <a:off x="5340433" y="212486"/>
+            <a:off x="5340433" y="258206"/>
             <a:ext cx="4478686" cy="6440873"/>
           </a:xfrm>
           <a:prstGeom prst="rect">

</xml_diff>